<commit_message>
change name and image
</commit_message>
<xml_diff>
--- a/ppt_graphics/01_dist_Chp1_JoseLastra.pptx
+++ b/ppt_graphics/01_dist_Chp1_JoseLastra.pptx
@@ -260,7 +260,7 @@
           <a:p>
             <a:fld id="{9D0D92BC-42A9-434B-8530-ADBF4485E407}" type="datetimeFigureOut">
               <a:rPr lang="en-US" smtClean="0"/>
-              <a:t>6/25/2024</a:t>
+              <a:t>9/30/2024</a:t>
             </a:fld>
             <a:endParaRPr lang="en-US"/>
           </a:p>
@@ -458,7 +458,7 @@
           <a:p>
             <a:fld id="{9D0D92BC-42A9-434B-8530-ADBF4485E407}" type="datetimeFigureOut">
               <a:rPr lang="en-US" smtClean="0"/>
-              <a:t>6/25/2024</a:t>
+              <a:t>9/30/2024</a:t>
             </a:fld>
             <a:endParaRPr lang="en-US"/>
           </a:p>
@@ -666,7 +666,7 @@
           <a:p>
             <a:fld id="{9D0D92BC-42A9-434B-8530-ADBF4485E407}" type="datetimeFigureOut">
               <a:rPr lang="en-US" smtClean="0"/>
-              <a:t>6/25/2024</a:t>
+              <a:t>9/30/2024</a:t>
             </a:fld>
             <a:endParaRPr lang="en-US"/>
           </a:p>
@@ -864,7 +864,7 @@
           <a:p>
             <a:fld id="{9D0D92BC-42A9-434B-8530-ADBF4485E407}" type="datetimeFigureOut">
               <a:rPr lang="en-US" smtClean="0"/>
-              <a:t>6/25/2024</a:t>
+              <a:t>9/30/2024</a:t>
             </a:fld>
             <a:endParaRPr lang="en-US"/>
           </a:p>
@@ -1139,7 +1139,7 @@
           <a:p>
             <a:fld id="{9D0D92BC-42A9-434B-8530-ADBF4485E407}" type="datetimeFigureOut">
               <a:rPr lang="en-US" smtClean="0"/>
-              <a:t>6/25/2024</a:t>
+              <a:t>9/30/2024</a:t>
             </a:fld>
             <a:endParaRPr lang="en-US"/>
           </a:p>
@@ -1404,7 +1404,7 @@
           <a:p>
             <a:fld id="{9D0D92BC-42A9-434B-8530-ADBF4485E407}" type="datetimeFigureOut">
               <a:rPr lang="en-US" smtClean="0"/>
-              <a:t>6/25/2024</a:t>
+              <a:t>9/30/2024</a:t>
             </a:fld>
             <a:endParaRPr lang="en-US"/>
           </a:p>
@@ -1816,7 +1816,7 @@
           <a:p>
             <a:fld id="{9D0D92BC-42A9-434B-8530-ADBF4485E407}" type="datetimeFigureOut">
               <a:rPr lang="en-US" smtClean="0"/>
-              <a:t>6/25/2024</a:t>
+              <a:t>9/30/2024</a:t>
             </a:fld>
             <a:endParaRPr lang="en-US"/>
           </a:p>
@@ -1957,7 +1957,7 @@
           <a:p>
             <a:fld id="{9D0D92BC-42A9-434B-8530-ADBF4485E407}" type="datetimeFigureOut">
               <a:rPr lang="en-US" smtClean="0"/>
-              <a:t>6/25/2024</a:t>
+              <a:t>9/30/2024</a:t>
             </a:fld>
             <a:endParaRPr lang="en-US"/>
           </a:p>
@@ -2070,7 +2070,7 @@
           <a:p>
             <a:fld id="{9D0D92BC-42A9-434B-8530-ADBF4485E407}" type="datetimeFigureOut">
               <a:rPr lang="en-US" smtClean="0"/>
-              <a:t>6/25/2024</a:t>
+              <a:t>9/30/2024</a:t>
             </a:fld>
             <a:endParaRPr lang="en-US"/>
           </a:p>
@@ -2381,7 +2381,7 @@
           <a:p>
             <a:fld id="{9D0D92BC-42A9-434B-8530-ADBF4485E407}" type="datetimeFigureOut">
               <a:rPr lang="en-US" smtClean="0"/>
-              <a:t>6/25/2024</a:t>
+              <a:t>9/30/2024</a:t>
             </a:fld>
             <a:endParaRPr lang="en-US"/>
           </a:p>
@@ -2669,7 +2669,7 @@
           <a:p>
             <a:fld id="{9D0D92BC-42A9-434B-8530-ADBF4485E407}" type="datetimeFigureOut">
               <a:rPr lang="en-US" smtClean="0"/>
-              <a:t>6/25/2024</a:t>
+              <a:t>9/30/2024</a:t>
             </a:fld>
             <a:endParaRPr lang="en-US"/>
           </a:p>
@@ -2911,7 +2911,7 @@
             <a:fld id="{9D0D92BC-42A9-434B-8530-ADBF4485E407}" type="datetimeFigureOut">
               <a:rPr lang="en-US" smtClean="0"/>
               <a:pPr/>
-              <a:t>6/25/2024</a:t>
+              <a:t>9/30/2024</a:t>
             </a:fld>
             <a:endParaRPr lang="en-US" dirty="0"/>
           </a:p>
@@ -3354,6 +3354,17 @@
         <p:blipFill rotWithShape="1">
           <a:blip r:embed="rId2">
             <a:alphaModFix/>
+            <a:extLst>
+              <a:ext uri="{BEBA8EAE-BF5A-486C-A8C5-ECC9F3942E4B}">
+                <a14:imgProps xmlns:a14="http://schemas.microsoft.com/office/drawing/2010/main">
+                  <a14:imgLayer r:embed="rId3">
+                    <a14:imgEffect>
+                      <a14:artisticPencilGrayscale trans="49000" pencilSize="0"/>
+                    </a14:imgEffect>
+                  </a14:imgLayer>
+                </a14:imgProps>
+              </a:ext>
+            </a:extLst>
           </a:blip>
           <a:srcRect t="23"/>
           <a:stretch/>
@@ -3456,8 +3467,8 @@
         </p:nvSpPr>
         <p:spPr>
           <a:xfrm>
-            <a:off x="7376161" y="2211978"/>
-            <a:ext cx="3535679" cy="1425728"/>
+            <a:off x="7264302" y="2198466"/>
+            <a:ext cx="3757507" cy="1425728"/>
           </a:xfrm>
         </p:spPr>
         <p:txBody>
@@ -3473,9 +3484,9 @@
             </a:pPr>
             <a:r>
               <a:rPr lang="en-US" sz="2600" dirty="0">
-                <a:latin typeface="+mn-lt"/>
+                <a:latin typeface="Bahnschrift SemiBold Condensed" panose="020B0502040204020203" pitchFamily="34" charset="0"/>
               </a:rPr>
-              <a:t>Ch.1: LSP Central-South Chile</a:t>
+              <a:t>Ch.1: Disturbance analysis for Central-South Chile</a:t>
             </a:r>
           </a:p>
         </p:txBody>
@@ -3514,7 +3525,9 @@
               </a:lnSpc>
             </a:pPr>
             <a:r>
-              <a:rPr lang="en-US" sz="1300" dirty="0"/>
+              <a:rPr lang="en-US" sz="1300" dirty="0">
+                <a:latin typeface="Bahnschrift Condensed" panose="020B0502040204020203" pitchFamily="34" charset="0"/>
+              </a:rPr>
               <a:t>José A. Lastra (GRS)</a:t>
             </a:r>
           </a:p>
@@ -3525,7 +3538,9 @@
               </a:lnSpc>
             </a:pPr>
             <a:r>
-              <a:rPr lang="en-US" sz="1300" dirty="0"/>
+              <a:rPr lang="en-US" sz="1300" dirty="0">
+                <a:latin typeface="Bahnschrift Condensed" panose="020B0502040204020203" pitchFamily="34" charset="0"/>
+              </a:rPr>
               <a:t>Funded by: ANID BECAS/DOCTORADO EN EL EXTRANJERO 2023/72230136</a:t>
             </a:r>
           </a:p>
@@ -3734,6 +3749,7 @@
                 <a:solidFill>
                   <a:srgbClr val="FFFFFF"/>
                 </a:solidFill>
+                <a:latin typeface="Bahnschrift Condensed" panose="020B0502040204020203" pitchFamily="34" charset="0"/>
               </a:rPr>
               <a:t>June 2024</a:t>
             </a:r>
@@ -3741,6 +3757,7 @@
               <a:solidFill>
                 <a:schemeClr val="bg1"/>
               </a:solidFill>
+              <a:latin typeface="Bahnschrift Condensed" panose="020B0502040204020203" pitchFamily="34" charset="0"/>
             </a:endParaRPr>
           </a:p>
         </p:txBody>
@@ -3760,13 +3777,13 @@
           <p:nvPr/>
         </p:nvPicPr>
         <p:blipFill>
-          <a:blip r:embed="rId3">
+          <a:blip r:embed="rId4">
             <a:extLst>
               <a:ext uri="{28A0092B-C50C-407E-A947-70E740481C1C}">
                 <a14:useLocalDpi xmlns:a14="http://schemas.microsoft.com/office/drawing/2010/main" val="0"/>
               </a:ext>
               <a:ext uri="{96DAC541-7B7A-43D3-8B79-37D633B846F1}">
-                <asvg:svgBlip xmlns:asvg="http://schemas.microsoft.com/office/drawing/2016/SVG/main" r:embed="rId4"/>
+                <asvg:svgBlip xmlns:asvg="http://schemas.microsoft.com/office/drawing/2016/SVG/main" r:embed="rId5"/>
               </a:ext>
             </a:extLst>
           </a:blip>
@@ -3776,12 +3793,80 @@
         </p:blipFill>
         <p:spPr>
           <a:xfrm>
-            <a:off x="9629578" y="-101744"/>
+            <a:off x="8639032" y="5941025"/>
             <a:ext cx="2717495" cy="802080"/>
           </a:xfrm>
           <a:prstGeom prst="rect">
             <a:avLst/>
           </a:prstGeom>
+        </p:spPr>
+      </p:pic>
+      <p:pic>
+        <p:nvPicPr>
+          <p:cNvPr id="7" name="Picture 8">
+            <a:extLst>
+              <a:ext uri="{FF2B5EF4-FFF2-40B4-BE49-F238E27FC236}">
+                <a16:creationId xmlns:a16="http://schemas.microsoft.com/office/drawing/2014/main" id="{F5E6FDB2-8BDA-AF75-3485-DA67727BB56F}"/>
+              </a:ext>
+            </a:extLst>
+          </p:cNvPr>
+          <p:cNvPicPr>
+            <a:picLocks noChangeAspect="1" noChangeArrowheads="1"/>
+          </p:cNvPicPr>
+          <p:nvPr/>
+        </p:nvPicPr>
+        <p:blipFill rotWithShape="1">
+          <a:blip r:embed="rId6">
+            <a:extLst>
+              <a:ext uri="{28A0092B-C50C-407E-A947-70E740481C1C}">
+                <a14:useLocalDpi xmlns:a14="http://schemas.microsoft.com/office/drawing/2010/main" val="0"/>
+              </a:ext>
+            </a:extLst>
+          </a:blip>
+          <a:srcRect l="3684" t="3368" r="3052" b="3790"/>
+          <a:stretch/>
+        </p:blipFill>
+        <p:spPr bwMode="auto">
+          <a:xfrm>
+            <a:off x="11224537" y="5884948"/>
+            <a:ext cx="892599" cy="888569"/>
+          </a:xfrm>
+          <a:prstGeom prst="ellipse">
+            <a:avLst/>
+          </a:prstGeom>
+          <a:ln w="3175" cap="rnd">
+            <a:solidFill>
+              <a:srgbClr val="333333"/>
+            </a:solidFill>
+          </a:ln>
+          <a:effectLst>
+            <a:outerShdw blurRad="381000" dist="292100" dir="5400000" sx="-80000" sy="-18000" rotWithShape="0">
+              <a:srgbClr val="000000">
+                <a:alpha val="22000"/>
+              </a:srgbClr>
+            </a:outerShdw>
+          </a:effectLst>
+          <a:scene3d>
+            <a:camera prst="orthographicFront"/>
+            <a:lightRig rig="contrasting" dir="t">
+              <a:rot lat="0" lon="0" rev="3000000"/>
+            </a:lightRig>
+          </a:scene3d>
+          <a:sp3d contourW="7620">
+            <a:bevelT w="95250" h="31750"/>
+            <a:contourClr>
+              <a:srgbClr val="333333"/>
+            </a:contourClr>
+          </a:sp3d>
+          <a:extLst>
+            <a:ext uri="{909E8E84-426E-40DD-AFC4-6F175D3DCCD1}">
+              <a14:hiddenFill xmlns:a14="http://schemas.microsoft.com/office/drawing/2010/main">
+                <a:solidFill>
+                  <a:srgbClr val="FFFFFF"/>
+                </a:solidFill>
+              </a14:hiddenFill>
+            </a:ext>
+          </a:extLst>
         </p:spPr>
       </p:pic>
     </p:spTree>

</xml_diff>